<commit_message>
updated docs added QTP Test plan
</commit_message>
<xml_diff>
--- a/_3 Develop/Interface PCB/IF PCB Schematic.pptx
+++ b/_3 Develop/Interface PCB/IF PCB Schematic.pptx
@@ -7,6 +7,7 @@
   <p:sldIdLst>
     <p:sldId id="256" r:id="rId2"/>
     <p:sldId id="257" r:id="rId3"/>
+    <p:sldId id="258" r:id="rId4"/>
   </p:sldIdLst>
   <p:sldSz cx="12192000" cy="6858000"/>
   <p:notesSz cx="6858000" cy="9144000"/>
@@ -260,7 +261,7 @@
           <a:p>
             <a:fld id="{AE243352-5044-4C09-BD4D-CD54BE26D974}" type="datetimeFigureOut">
               <a:rPr lang="en-US" smtClean="0"/>
-              <a:t>3/13/2025</a:t>
+              <a:t>3/17/2025</a:t>
             </a:fld>
             <a:endParaRPr lang="en-US"/>
           </a:p>
@@ -458,7 +459,7 @@
           <a:p>
             <a:fld id="{AE243352-5044-4C09-BD4D-CD54BE26D974}" type="datetimeFigureOut">
               <a:rPr lang="en-US" smtClean="0"/>
-              <a:t>3/13/2025</a:t>
+              <a:t>3/17/2025</a:t>
             </a:fld>
             <a:endParaRPr lang="en-US"/>
           </a:p>
@@ -666,7 +667,7 @@
           <a:p>
             <a:fld id="{AE243352-5044-4C09-BD4D-CD54BE26D974}" type="datetimeFigureOut">
               <a:rPr lang="en-US" smtClean="0"/>
-              <a:t>3/13/2025</a:t>
+              <a:t>3/17/2025</a:t>
             </a:fld>
             <a:endParaRPr lang="en-US"/>
           </a:p>
@@ -864,7 +865,7 @@
           <a:p>
             <a:fld id="{AE243352-5044-4C09-BD4D-CD54BE26D974}" type="datetimeFigureOut">
               <a:rPr lang="en-US" smtClean="0"/>
-              <a:t>3/13/2025</a:t>
+              <a:t>3/17/2025</a:t>
             </a:fld>
             <a:endParaRPr lang="en-US"/>
           </a:p>
@@ -1139,7 +1140,7 @@
           <a:p>
             <a:fld id="{AE243352-5044-4C09-BD4D-CD54BE26D974}" type="datetimeFigureOut">
               <a:rPr lang="en-US" smtClean="0"/>
-              <a:t>3/13/2025</a:t>
+              <a:t>3/17/2025</a:t>
             </a:fld>
             <a:endParaRPr lang="en-US"/>
           </a:p>
@@ -1404,7 +1405,7 @@
           <a:p>
             <a:fld id="{AE243352-5044-4C09-BD4D-CD54BE26D974}" type="datetimeFigureOut">
               <a:rPr lang="en-US" smtClean="0"/>
-              <a:t>3/13/2025</a:t>
+              <a:t>3/17/2025</a:t>
             </a:fld>
             <a:endParaRPr lang="en-US"/>
           </a:p>
@@ -1816,7 +1817,7 @@
           <a:p>
             <a:fld id="{AE243352-5044-4C09-BD4D-CD54BE26D974}" type="datetimeFigureOut">
               <a:rPr lang="en-US" smtClean="0"/>
-              <a:t>3/13/2025</a:t>
+              <a:t>3/17/2025</a:t>
             </a:fld>
             <a:endParaRPr lang="en-US"/>
           </a:p>
@@ -1957,7 +1958,7 @@
           <a:p>
             <a:fld id="{AE243352-5044-4C09-BD4D-CD54BE26D974}" type="datetimeFigureOut">
               <a:rPr lang="en-US" smtClean="0"/>
-              <a:t>3/13/2025</a:t>
+              <a:t>3/17/2025</a:t>
             </a:fld>
             <a:endParaRPr lang="en-US"/>
           </a:p>
@@ -2070,7 +2071,7 @@
           <a:p>
             <a:fld id="{AE243352-5044-4C09-BD4D-CD54BE26D974}" type="datetimeFigureOut">
               <a:rPr lang="en-US" smtClean="0"/>
-              <a:t>3/13/2025</a:t>
+              <a:t>3/17/2025</a:t>
             </a:fld>
             <a:endParaRPr lang="en-US"/>
           </a:p>
@@ -2381,7 +2382,7 @@
           <a:p>
             <a:fld id="{AE243352-5044-4C09-BD4D-CD54BE26D974}" type="datetimeFigureOut">
               <a:rPr lang="en-US" smtClean="0"/>
-              <a:t>3/13/2025</a:t>
+              <a:t>3/17/2025</a:t>
             </a:fld>
             <a:endParaRPr lang="en-US"/>
           </a:p>
@@ -2669,7 +2670,7 @@
           <a:p>
             <a:fld id="{AE243352-5044-4C09-BD4D-CD54BE26D974}" type="datetimeFigureOut">
               <a:rPr lang="en-US" smtClean="0"/>
-              <a:t>3/13/2025</a:t>
+              <a:t>3/17/2025</a:t>
             </a:fld>
             <a:endParaRPr lang="en-US"/>
           </a:p>
@@ -2910,7 +2911,7 @@
           <a:p>
             <a:fld id="{AE243352-5044-4C09-BD4D-CD54BE26D974}" type="datetimeFigureOut">
               <a:rPr lang="en-US" smtClean="0"/>
-              <a:t>3/13/2025</a:t>
+              <a:t>3/17/2025</a:t>
             </a:fld>
             <a:endParaRPr lang="en-US"/>
           </a:p>
@@ -4453,6 +4454,152 @@
 </p:sld>
 </file>
 
+<file path=ppt/slides/slide3.xml><?xml version="1.0" encoding="utf-8"?>
+<p:sld xmlns:a="http://schemas.openxmlformats.org/drawingml/2006/main" xmlns:r="http://schemas.openxmlformats.org/officeDocument/2006/relationships" xmlns:p="http://schemas.openxmlformats.org/presentationml/2006/main">
+  <p:cSld>
+    <p:spTree>
+      <p:nvGrpSpPr>
+        <p:cNvPr id="1" name=""/>
+        <p:cNvGrpSpPr/>
+        <p:nvPr/>
+      </p:nvGrpSpPr>
+      <p:grpSpPr>
+        <a:xfrm>
+          <a:off x="0" y="0"/>
+          <a:ext cx="0" cy="0"/>
+          <a:chOff x="0" y="0"/>
+          <a:chExt cx="0" cy="0"/>
+        </a:xfrm>
+      </p:grpSpPr>
+      <p:pic>
+        <p:nvPicPr>
+          <p:cNvPr id="7" name="Picture 6">
+            <a:extLst>
+              <a:ext uri="{FF2B5EF4-FFF2-40B4-BE49-F238E27FC236}">
+                <a16:creationId xmlns:a16="http://schemas.microsoft.com/office/drawing/2014/main" id="{A4E83268-97E2-20F8-4098-A000269C9676}"/>
+              </a:ext>
+            </a:extLst>
+          </p:cNvPr>
+          <p:cNvPicPr>
+            <a:picLocks noChangeAspect="1"/>
+          </p:cNvPicPr>
+          <p:nvPr/>
+        </p:nvPicPr>
+        <p:blipFill>
+          <a:blip r:embed="rId2"/>
+          <a:stretch>
+            <a:fillRect/>
+          </a:stretch>
+        </p:blipFill>
+        <p:spPr>
+          <a:xfrm>
+            <a:off x="206719" y="494891"/>
+            <a:ext cx="4763165" cy="2934109"/>
+          </a:xfrm>
+          <a:prstGeom prst="rect">
+            <a:avLst/>
+          </a:prstGeom>
+        </p:spPr>
+      </p:pic>
+      <p:pic>
+        <p:nvPicPr>
+          <p:cNvPr id="9" name="Picture 8">
+            <a:extLst>
+              <a:ext uri="{FF2B5EF4-FFF2-40B4-BE49-F238E27FC236}">
+                <a16:creationId xmlns:a16="http://schemas.microsoft.com/office/drawing/2014/main" id="{5E7D63C6-ECDA-0D1A-DFB8-A34B3DE2CD97}"/>
+              </a:ext>
+            </a:extLst>
+          </p:cNvPr>
+          <p:cNvPicPr>
+            <a:picLocks noChangeAspect="1"/>
+          </p:cNvPicPr>
+          <p:nvPr/>
+        </p:nvPicPr>
+        <p:blipFill>
+          <a:blip r:embed="rId3"/>
+          <a:stretch>
+            <a:fillRect/>
+          </a:stretch>
+        </p:blipFill>
+        <p:spPr>
+          <a:xfrm>
+            <a:off x="5499863" y="329784"/>
+            <a:ext cx="5921412" cy="5763718"/>
+          </a:xfrm>
+          <a:prstGeom prst="rect">
+            <a:avLst/>
+          </a:prstGeom>
+        </p:spPr>
+      </p:pic>
+      <p:sp>
+        <p:nvSpPr>
+          <p:cNvPr id="10" name="TextBox 9">
+            <a:extLst>
+              <a:ext uri="{FF2B5EF4-FFF2-40B4-BE49-F238E27FC236}">
+                <a16:creationId xmlns:a16="http://schemas.microsoft.com/office/drawing/2014/main" id="{279AFC1E-57B5-4977-FF0D-E11FECA5C280}"/>
+              </a:ext>
+            </a:extLst>
+          </p:cNvPr>
+          <p:cNvSpPr txBox="1"/>
+          <p:nvPr/>
+        </p:nvSpPr>
+        <p:spPr>
+          <a:xfrm>
+            <a:off x="1409075" y="4287187"/>
+            <a:ext cx="2903552" cy="923330"/>
+          </a:xfrm>
+          <a:prstGeom prst="rect">
+            <a:avLst/>
+          </a:prstGeom>
+          <a:noFill/>
+        </p:spPr>
+        <p:txBody>
+          <a:bodyPr wrap="none" rtlCol="0">
+            <a:spAutoFit/>
+          </a:bodyPr>
+          <a:lstStyle/>
+          <a:p>
+            <a:pPr marL="342900" indent="-342900">
+              <a:buAutoNum type="arabicPeriod"/>
+            </a:pPr>
+            <a:r>
+              <a:rPr lang="en-US" dirty="0"/>
+              <a:t>VDS  is D = Neg, S = Pos</a:t>
+            </a:r>
+          </a:p>
+          <a:p>
+            <a:pPr marL="342900" indent="-342900">
+              <a:buAutoNum type="arabicPeriod"/>
+            </a:pPr>
+            <a:r>
+              <a:rPr lang="en-US" dirty="0"/>
+              <a:t>VGS = 0  Channel is ON</a:t>
+            </a:r>
+          </a:p>
+          <a:p>
+            <a:pPr marL="342900" indent="-342900">
+              <a:buAutoNum type="arabicPeriod"/>
+            </a:pPr>
+            <a:r>
+              <a:rPr lang="en-US" dirty="0"/>
+              <a:t>VGS &gt; 0  Channel is OFF</a:t>
+            </a:r>
+          </a:p>
+        </p:txBody>
+      </p:sp>
+    </p:spTree>
+    <p:extLst>
+      <p:ext uri="{BB962C8B-B14F-4D97-AF65-F5344CB8AC3E}">
+        <p14:creationId xmlns:p14="http://schemas.microsoft.com/office/powerpoint/2010/main" val="2183574465"/>
+      </p:ext>
+    </p:extLst>
+  </p:cSld>
+  <p:clrMapOvr>
+    <a:masterClrMapping/>
+  </p:clrMapOvr>
+</p:sld>
+</file>
+
 <file path=ppt/theme/theme1.xml><?xml version="1.0" encoding="utf-8"?>
 <a:theme xmlns:a="http://schemas.openxmlformats.org/drawingml/2006/main" name="Office Theme">
   <a:themeElements>

</xml_diff>